<commit_message>
Added IoT shadow icons to detailed diagram
</commit_message>
<xml_diff>
--- a/docs/images/iot-connectivity-security-architecture-diagram.pptx
+++ b/docs/images/iot-connectivity-security-architecture-diagram.pptx
@@ -16103,7 +16103,7 @@
         </p:blipFill>
         <p:spPr>
           <a:xfrm>
-            <a:off x="7487502" y="1733755"/>
+            <a:off x="7279445" y="1733755"/>
             <a:ext cx="332447" cy="332277"/>
           </a:xfrm>
           <a:custGeom>
@@ -16396,7 +16396,7 @@
         </p:blipFill>
         <p:spPr>
           <a:xfrm>
-            <a:off x="7479465" y="2568028"/>
+            <a:off x="7279445" y="2568028"/>
             <a:ext cx="332447" cy="332277"/>
           </a:xfrm>
           <a:custGeom>
@@ -17472,7 +17472,7 @@
         </p:blipFill>
         <p:spPr>
           <a:xfrm>
-            <a:off x="7479810" y="3417335"/>
+            <a:off x="7279445" y="3417335"/>
             <a:ext cx="332447" cy="332277"/>
           </a:xfrm>
           <a:custGeom>
@@ -17673,7 +17673,7 @@
         </p:blipFill>
         <p:spPr>
           <a:xfrm>
-            <a:off x="7481959" y="4435249"/>
+            <a:off x="7279445" y="4435249"/>
             <a:ext cx="332447" cy="332277"/>
           </a:xfrm>
           <a:custGeom>
@@ -18538,6 +18538,246 @@
           </a:p>
         </p:txBody>
       </p:sp>
+      <p:pic>
+        <p:nvPicPr>
+          <p:cNvPr id="157" name="Graphic 57">
+            <a:extLst>
+              <a:ext uri="{FF2B5EF4-FFF2-40B4-BE49-F238E27FC236}">
+                <a16:creationId xmlns:a16="http://schemas.microsoft.com/office/drawing/2014/main" id="{9ED494D4-11D2-4512-A45A-C4DBAC3D8A35}"/>
+              </a:ext>
+            </a:extLst>
+          </p:cNvPr>
+          <p:cNvPicPr>
+            <a:picLocks noChangeAspect="1" noChangeArrowheads="1"/>
+          </p:cNvPicPr>
+          <p:nvPr/>
+        </p:nvPicPr>
+        <p:blipFill>
+          <a:blip r:embed="rId23">
+            <a:extLst>
+              <a:ext uri="{28A0092B-C50C-407E-A947-70E740481C1C}">
+                <a14:useLocalDpi xmlns:a14="http://schemas.microsoft.com/office/drawing/2010/main" val="0"/>
+              </a:ext>
+            </a:extLst>
+          </a:blip>
+          <a:srcRect/>
+          <a:stretch>
+            <a:fillRect/>
+          </a:stretch>
+        </p:blipFill>
+        <p:spPr bwMode="auto">
+          <a:xfrm>
+            <a:off x="7711864" y="1742203"/>
+            <a:ext cx="308404" cy="308404"/>
+          </a:xfrm>
+          <a:prstGeom prst="rect">
+            <a:avLst/>
+          </a:prstGeom>
+          <a:noFill/>
+          <a:ln>
+            <a:noFill/>
+          </a:ln>
+          <a:extLst>
+            <a:ext uri="{909E8E84-426E-40DD-AFC4-6F175D3DCCD1}">
+              <a14:hiddenFill xmlns:a14="http://schemas.microsoft.com/office/drawing/2010/main">
+                <a:solidFill>
+                  <a:srgbClr val="FFFFFF"/>
+                </a:solidFill>
+              </a14:hiddenFill>
+            </a:ext>
+            <a:ext uri="{91240B29-F687-4F45-9708-019B960494DF}">
+              <a14:hiddenLine xmlns:a14="http://schemas.microsoft.com/office/drawing/2010/main" w="9525">
+                <a:solidFill>
+                  <a:srgbClr val="000000"/>
+                </a:solidFill>
+                <a:miter lim="800000"/>
+                <a:headEnd/>
+                <a:tailEnd/>
+              </a14:hiddenLine>
+            </a:ext>
+          </a:extLst>
+        </p:spPr>
+      </p:pic>
+      <p:pic>
+        <p:nvPicPr>
+          <p:cNvPr id="158" name="Graphic 57">
+            <a:extLst>
+              <a:ext uri="{FF2B5EF4-FFF2-40B4-BE49-F238E27FC236}">
+                <a16:creationId xmlns:a16="http://schemas.microsoft.com/office/drawing/2014/main" id="{EC110D09-BB49-4408-9DDE-B5D3A7BEA738}"/>
+              </a:ext>
+            </a:extLst>
+          </p:cNvPr>
+          <p:cNvPicPr>
+            <a:picLocks noChangeAspect="1" noChangeArrowheads="1"/>
+          </p:cNvPicPr>
+          <p:nvPr/>
+        </p:nvPicPr>
+        <p:blipFill>
+          <a:blip r:embed="rId23">
+            <a:extLst>
+              <a:ext uri="{28A0092B-C50C-407E-A947-70E740481C1C}">
+                <a14:useLocalDpi xmlns:a14="http://schemas.microsoft.com/office/drawing/2010/main" val="0"/>
+              </a:ext>
+            </a:extLst>
+          </a:blip>
+          <a:srcRect/>
+          <a:stretch>
+            <a:fillRect/>
+          </a:stretch>
+        </p:blipFill>
+        <p:spPr bwMode="auto">
+          <a:xfrm>
+            <a:off x="7711864" y="2574871"/>
+            <a:ext cx="308404" cy="308404"/>
+          </a:xfrm>
+          <a:prstGeom prst="rect">
+            <a:avLst/>
+          </a:prstGeom>
+          <a:noFill/>
+          <a:ln>
+            <a:noFill/>
+          </a:ln>
+          <a:extLst>
+            <a:ext uri="{909E8E84-426E-40DD-AFC4-6F175D3DCCD1}">
+              <a14:hiddenFill xmlns:a14="http://schemas.microsoft.com/office/drawing/2010/main">
+                <a:solidFill>
+                  <a:srgbClr val="FFFFFF"/>
+                </a:solidFill>
+              </a14:hiddenFill>
+            </a:ext>
+            <a:ext uri="{91240B29-F687-4F45-9708-019B960494DF}">
+              <a14:hiddenLine xmlns:a14="http://schemas.microsoft.com/office/drawing/2010/main" w="9525">
+                <a:solidFill>
+                  <a:srgbClr val="000000"/>
+                </a:solidFill>
+                <a:miter lim="800000"/>
+                <a:headEnd/>
+                <a:tailEnd/>
+              </a14:hiddenLine>
+            </a:ext>
+          </a:extLst>
+        </p:spPr>
+      </p:pic>
+      <p:pic>
+        <p:nvPicPr>
+          <p:cNvPr id="160" name="Graphic 57">
+            <a:extLst>
+              <a:ext uri="{FF2B5EF4-FFF2-40B4-BE49-F238E27FC236}">
+                <a16:creationId xmlns:a16="http://schemas.microsoft.com/office/drawing/2014/main" id="{DC5204B7-6047-4943-A087-4C0F27781B76}"/>
+              </a:ext>
+            </a:extLst>
+          </p:cNvPr>
+          <p:cNvPicPr>
+            <a:picLocks noChangeAspect="1" noChangeArrowheads="1"/>
+          </p:cNvPicPr>
+          <p:nvPr/>
+        </p:nvPicPr>
+        <p:blipFill>
+          <a:blip r:embed="rId23">
+            <a:extLst>
+              <a:ext uri="{28A0092B-C50C-407E-A947-70E740481C1C}">
+                <a14:useLocalDpi xmlns:a14="http://schemas.microsoft.com/office/drawing/2010/main" val="0"/>
+              </a:ext>
+            </a:extLst>
+          </a:blip>
+          <a:srcRect/>
+          <a:stretch>
+            <a:fillRect/>
+          </a:stretch>
+        </p:blipFill>
+        <p:spPr bwMode="auto">
+          <a:xfrm>
+            <a:off x="7711864" y="3421117"/>
+            <a:ext cx="308404" cy="308404"/>
+          </a:xfrm>
+          <a:prstGeom prst="rect">
+            <a:avLst/>
+          </a:prstGeom>
+          <a:noFill/>
+          <a:ln>
+            <a:noFill/>
+          </a:ln>
+          <a:extLst>
+            <a:ext uri="{909E8E84-426E-40DD-AFC4-6F175D3DCCD1}">
+              <a14:hiddenFill xmlns:a14="http://schemas.microsoft.com/office/drawing/2010/main">
+                <a:solidFill>
+                  <a:srgbClr val="FFFFFF"/>
+                </a:solidFill>
+              </a14:hiddenFill>
+            </a:ext>
+            <a:ext uri="{91240B29-F687-4F45-9708-019B960494DF}">
+              <a14:hiddenLine xmlns:a14="http://schemas.microsoft.com/office/drawing/2010/main" w="9525">
+                <a:solidFill>
+                  <a:srgbClr val="000000"/>
+                </a:solidFill>
+                <a:miter lim="800000"/>
+                <a:headEnd/>
+                <a:tailEnd/>
+              </a14:hiddenLine>
+            </a:ext>
+          </a:extLst>
+        </p:spPr>
+      </p:pic>
+      <p:pic>
+        <p:nvPicPr>
+          <p:cNvPr id="161" name="Graphic 57">
+            <a:extLst>
+              <a:ext uri="{FF2B5EF4-FFF2-40B4-BE49-F238E27FC236}">
+                <a16:creationId xmlns:a16="http://schemas.microsoft.com/office/drawing/2014/main" id="{6FCBBB74-467C-44DA-8A02-B07C42CE4D5E}"/>
+              </a:ext>
+            </a:extLst>
+          </p:cNvPr>
+          <p:cNvPicPr>
+            <a:picLocks noChangeAspect="1" noChangeArrowheads="1"/>
+          </p:cNvPicPr>
+          <p:nvPr/>
+        </p:nvPicPr>
+        <p:blipFill>
+          <a:blip r:embed="rId23">
+            <a:extLst>
+              <a:ext uri="{28A0092B-C50C-407E-A947-70E740481C1C}">
+                <a14:useLocalDpi xmlns:a14="http://schemas.microsoft.com/office/drawing/2010/main" val="0"/>
+              </a:ext>
+            </a:extLst>
+          </a:blip>
+          <a:srcRect/>
+          <a:stretch>
+            <a:fillRect/>
+          </a:stretch>
+        </p:blipFill>
+        <p:spPr bwMode="auto">
+          <a:xfrm>
+            <a:off x="7711864" y="4435153"/>
+            <a:ext cx="308404" cy="308404"/>
+          </a:xfrm>
+          <a:prstGeom prst="rect">
+            <a:avLst/>
+          </a:prstGeom>
+          <a:noFill/>
+          <a:ln>
+            <a:noFill/>
+          </a:ln>
+          <a:extLst>
+            <a:ext uri="{909E8E84-426E-40DD-AFC4-6F175D3DCCD1}">
+              <a14:hiddenFill xmlns:a14="http://schemas.microsoft.com/office/drawing/2010/main">
+                <a:solidFill>
+                  <a:srgbClr val="FFFFFF"/>
+                </a:solidFill>
+              </a14:hiddenFill>
+            </a:ext>
+            <a:ext uri="{91240B29-F687-4F45-9708-019B960494DF}">
+              <a14:hiddenLine xmlns:a14="http://schemas.microsoft.com/office/drawing/2010/main" w="9525">
+                <a:solidFill>
+                  <a:srgbClr val="000000"/>
+                </a:solidFill>
+                <a:miter lim="800000"/>
+                <a:headEnd/>
+                <a:tailEnd/>
+              </a14:hiddenLine>
+            </a:ext>
+          </a:extLst>
+        </p:spPr>
+      </p:pic>
     </p:spTree>
     <p:extLst>
       <p:ext uri="{BB962C8B-B14F-4D97-AF65-F5344CB8AC3E}">

</xml_diff>

<commit_message>
Edited the doc and embedded //TODO comments
</commit_message>
<xml_diff>
--- a/docs/images/iot-connectivity-security-architecture-diagram.pptx
+++ b/docs/images/iot-connectivity-security-architecture-diagram.pptx
@@ -117,11 +117,11 @@
         <p14:section name="Default Section" id="{D1C68A9D-A0B7-497D-A682-C07A8D5FCDB2}">
           <p14:sldIdLst>
             <p14:sldId id="258"/>
-            <p14:sldId id="256"/>
           </p14:sldIdLst>
         </p14:section>
         <p14:section name="Old, not used" id="{6B4D0326-4C66-4FDA-9A0F-62A7D4701C96}">
           <p14:sldIdLst>
+            <p14:sldId id="256"/>
             <p14:sldId id="260"/>
             <p14:sldId id="257"/>
             <p14:sldId id="259"/>
@@ -218,7 +218,7 @@
           <a:p>
             <a:fld id="{DBD8A52E-30DC-764B-8FF7-3BCE736694E8}" type="datetimeFigureOut">
               <a:rPr lang="en-US" smtClean="0"/>
-              <a:t>10/25/2021</a:t>
+              <a:t>12/11/2021</a:t>
             </a:fld>
             <a:endParaRPr lang="en-US" dirty="0"/>
           </a:p>
@@ -893,7 +893,7 @@
           <a:p>
             <a:fld id="{AA678395-77B4-A94B-9499-8B71386560B3}" type="datetimeFigureOut">
               <a:rPr lang="en-US" smtClean="0"/>
-              <a:t>10/25/2021</a:t>
+              <a:t>12/11/2021</a:t>
             </a:fld>
             <a:endParaRPr lang="en-US" dirty="0"/>
           </a:p>
@@ -1091,7 +1091,7 @@
           <a:p>
             <a:fld id="{AA678395-77B4-A94B-9499-8B71386560B3}" type="datetimeFigureOut">
               <a:rPr lang="en-US" smtClean="0"/>
-              <a:t>10/25/2021</a:t>
+              <a:t>12/11/2021</a:t>
             </a:fld>
             <a:endParaRPr lang="en-US" dirty="0"/>
           </a:p>
@@ -1299,7 +1299,7 @@
           <a:p>
             <a:fld id="{AA678395-77B4-A94B-9499-8B71386560B3}" type="datetimeFigureOut">
               <a:rPr lang="en-US" smtClean="0"/>
-              <a:t>10/25/2021</a:t>
+              <a:t>12/11/2021</a:t>
             </a:fld>
             <a:endParaRPr lang="en-US" dirty="0"/>
           </a:p>
@@ -1497,7 +1497,7 @@
           <a:p>
             <a:fld id="{AA678395-77B4-A94B-9499-8B71386560B3}" type="datetimeFigureOut">
               <a:rPr lang="en-US" smtClean="0"/>
-              <a:t>10/25/2021</a:t>
+              <a:t>12/11/2021</a:t>
             </a:fld>
             <a:endParaRPr lang="en-US" dirty="0"/>
           </a:p>
@@ -1772,7 +1772,7 @@
           <a:p>
             <a:fld id="{AA678395-77B4-A94B-9499-8B71386560B3}" type="datetimeFigureOut">
               <a:rPr lang="en-US" smtClean="0"/>
-              <a:t>10/25/2021</a:t>
+              <a:t>12/11/2021</a:t>
             </a:fld>
             <a:endParaRPr lang="en-US" dirty="0"/>
           </a:p>
@@ -2037,7 +2037,7 @@
           <a:p>
             <a:fld id="{AA678395-77B4-A94B-9499-8B71386560B3}" type="datetimeFigureOut">
               <a:rPr lang="en-US" smtClean="0"/>
-              <a:t>10/25/2021</a:t>
+              <a:t>12/11/2021</a:t>
             </a:fld>
             <a:endParaRPr lang="en-US" dirty="0"/>
           </a:p>
@@ -2449,7 +2449,7 @@
           <a:p>
             <a:fld id="{AA678395-77B4-A94B-9499-8B71386560B3}" type="datetimeFigureOut">
               <a:rPr lang="en-US" smtClean="0"/>
-              <a:t>10/25/2021</a:t>
+              <a:t>12/11/2021</a:t>
             </a:fld>
             <a:endParaRPr lang="en-US" dirty="0"/>
           </a:p>
@@ -2590,7 +2590,7 @@
           <a:p>
             <a:fld id="{AA678395-77B4-A94B-9499-8B71386560B3}" type="datetimeFigureOut">
               <a:rPr lang="en-US" smtClean="0"/>
-              <a:t>10/25/2021</a:t>
+              <a:t>12/11/2021</a:t>
             </a:fld>
             <a:endParaRPr lang="en-US" dirty="0"/>
           </a:p>
@@ -2703,7 +2703,7 @@
           <a:p>
             <a:fld id="{AA678395-77B4-A94B-9499-8B71386560B3}" type="datetimeFigureOut">
               <a:rPr lang="en-US" smtClean="0"/>
-              <a:t>10/25/2021</a:t>
+              <a:t>12/11/2021</a:t>
             </a:fld>
             <a:endParaRPr lang="en-US" dirty="0"/>
           </a:p>
@@ -3014,7 +3014,7 @@
           <a:p>
             <a:fld id="{AA678395-77B4-A94B-9499-8B71386560B3}" type="datetimeFigureOut">
               <a:rPr lang="en-US" smtClean="0"/>
-              <a:t>10/25/2021</a:t>
+              <a:t>12/11/2021</a:t>
             </a:fld>
             <a:endParaRPr lang="en-US" dirty="0"/>
           </a:p>
@@ -3302,7 +3302,7 @@
           <a:p>
             <a:fld id="{AA678395-77B4-A94B-9499-8B71386560B3}" type="datetimeFigureOut">
               <a:rPr lang="en-US" smtClean="0"/>
-              <a:t>10/25/2021</a:t>
+              <a:t>12/11/2021</a:t>
             </a:fld>
             <a:endParaRPr lang="en-US" dirty="0"/>
           </a:p>
@@ -3543,7 +3543,7 @@
           <a:p>
             <a:fld id="{AA678395-77B4-A94B-9499-8B71386560B3}" type="datetimeFigureOut">
               <a:rPr lang="en-US" smtClean="0"/>
-              <a:t>10/25/2021</a:t>
+              <a:t>12/11/2021</a:t>
             </a:fld>
             <a:endParaRPr lang="en-US" dirty="0"/>
           </a:p>
@@ -4903,7 +4903,7 @@
         </p:blipFill>
         <p:spPr bwMode="auto">
           <a:xfrm>
-            <a:off x="6762189" y="4484448"/>
+            <a:off x="6854953" y="4484448"/>
             <a:ext cx="762000" cy="762000"/>
           </a:xfrm>
           <a:prstGeom prst="rect">
@@ -4950,7 +4950,7 @@
         </p:nvSpPr>
         <p:spPr bwMode="auto">
           <a:xfrm>
-            <a:off x="6469477" y="5248786"/>
+            <a:off x="6562241" y="5248786"/>
             <a:ext cx="1340506" cy="276999"/>
           </a:xfrm>
           <a:prstGeom prst="rect">
@@ -5353,7 +5353,7 @@
         </p:nvSpPr>
         <p:spPr bwMode="auto">
           <a:xfrm>
-            <a:off x="5452120" y="3259774"/>
+            <a:off x="5410556" y="3259774"/>
             <a:ext cx="1362074" cy="646331"/>
           </a:xfrm>
           <a:prstGeom prst="rect">
@@ -5542,7 +5542,7 @@
         </p:blipFill>
         <p:spPr bwMode="auto">
           <a:xfrm>
-            <a:off x="5852158" y="1247753"/>
+            <a:off x="5862993" y="1247753"/>
             <a:ext cx="457200" cy="457200"/>
           </a:xfrm>
           <a:prstGeom prst="rect">
@@ -5839,8 +5839,8 @@
         </p:nvSpPr>
         <p:spPr>
           <a:xfrm>
-            <a:off x="1718740" y="537816"/>
-            <a:ext cx="6136640" cy="5288402"/>
+            <a:off x="1718739" y="537816"/>
+            <a:ext cx="7669453" cy="5288402"/>
           </a:xfrm>
           <a:prstGeom prst="rect">
             <a:avLst/>
@@ -5945,8 +5945,8 @@
         </p:nvSpPr>
         <p:spPr bwMode="auto">
           <a:xfrm>
-            <a:off x="7987407" y="2472545"/>
-            <a:ext cx="935551" cy="646331"/>
+            <a:off x="9388193" y="2472545"/>
+            <a:ext cx="935551" cy="461665"/>
           </a:xfrm>
           <a:prstGeom prst="rect">
             <a:avLst/>
@@ -6087,26 +6087,7 @@
                 <a:latin typeface="Arial" panose="020B0604020202020204" pitchFamily="34" charset="0"/>
                 <a:cs typeface="Arial" panose="020B0604020202020204" pitchFamily="34" charset="0"/>
               </a:rPr>
-              <a:t>End-user’s</a:t>
-            </a:r>
-            <a:br>
-              <a:rPr lang="en-US" altLang="en-US" sz="1200" dirty="0">
-                <a:solidFill>
-                  <a:srgbClr val="000000"/>
-                </a:solidFill>
-                <a:latin typeface="Arial" panose="020B0604020202020204" pitchFamily="34" charset="0"/>
-                <a:cs typeface="Arial" panose="020B0604020202020204" pitchFamily="34" charset="0"/>
-              </a:rPr>
-            </a:br>
-            <a:r>
-              <a:rPr lang="en-US" altLang="en-US" sz="1200" dirty="0">
-                <a:solidFill>
-                  <a:srgbClr val="000000"/>
-                </a:solidFill>
-                <a:latin typeface="Arial" panose="020B0604020202020204" pitchFamily="34" charset="0"/>
-                <a:cs typeface="Arial" panose="020B0604020202020204" pitchFamily="34" charset="0"/>
-              </a:rPr>
-              <a:t>web application</a:t>
+              <a:t>Web application</a:t>
             </a:r>
           </a:p>
         </p:txBody>
@@ -6174,8 +6155,8 @@
         </p:nvSpPr>
         <p:spPr bwMode="auto">
           <a:xfrm>
-            <a:off x="6618938" y="2533142"/>
-            <a:ext cx="1058743" cy="461665"/>
+            <a:off x="6711702" y="2472545"/>
+            <a:ext cx="1058743" cy="646331"/>
           </a:xfrm>
           <a:prstGeom prst="rect">
             <a:avLst/>
@@ -6307,6 +6288,16 @@
             </a:lvl9pPr>
           </a:lstStyle>
           <a:p>
+            <a:pPr algn="ctr"/>
+            <a:r>
+              <a:rPr lang="en-US" sz="1200" dirty="0">
+                <a:latin typeface="Arial" panose="020B0604020202020204" pitchFamily="34" charset="0"/>
+                <a:cs typeface="Arial" panose="020B0604020202020204" pitchFamily="34" charset="0"/>
+              </a:rPr>
+              <a:t>Amazon API Gateway</a:t>
+            </a:r>
+          </a:p>
+          <a:p>
             <a:pPr algn="ctr" eaLnBrk="1" hangingPunct="1"/>
             <a:r>
               <a:rPr lang="en-US" altLang="en-US" sz="1200" dirty="0">
@@ -6314,7 +6305,7 @@
                 <a:ea typeface="Amazon Ember" panose="020B0603020204020204" pitchFamily="34" charset="0"/>
                 <a:cs typeface="Arial" panose="020B0604020202020204" pitchFamily="34" charset="0"/>
               </a:rPr>
-              <a:t>API endpoints</a:t>
+              <a:t> endpoints</a:t>
             </a:r>
           </a:p>
         </p:txBody>
@@ -6346,7 +6337,7 @@
         </p:blipFill>
         <p:spPr bwMode="auto">
           <a:xfrm>
-            <a:off x="6902893" y="2035473"/>
+            <a:off x="7022161" y="2035473"/>
             <a:ext cx="457200" cy="457200"/>
           </a:xfrm>
           <a:prstGeom prst="rect">
@@ -6583,8 +6574,8 @@
         </p:nvCxnSpPr>
         <p:spPr>
           <a:xfrm flipH="1">
-            <a:off x="7360093" y="2262503"/>
-            <a:ext cx="935587" cy="1570"/>
+            <a:off x="7479361" y="2262503"/>
+            <a:ext cx="2217105" cy="1570"/>
           </a:xfrm>
           <a:prstGeom prst="straightConnector1">
             <a:avLst/>
@@ -6630,8 +6621,8 @@
         </p:nvCxnSpPr>
         <p:spPr>
           <a:xfrm flipV="1">
-            <a:off x="7143189" y="2994807"/>
-            <a:ext cx="5121" cy="1489641"/>
+            <a:off x="7235953" y="3118876"/>
+            <a:ext cx="5121" cy="1365572"/>
           </a:xfrm>
           <a:prstGeom prst="straightConnector1">
             <a:avLst/>
@@ -6688,7 +6679,7 @@
         </p:blipFill>
         <p:spPr bwMode="auto">
           <a:xfrm>
-            <a:off x="8295680" y="2103000"/>
+            <a:off x="9696466" y="2103000"/>
             <a:ext cx="319006" cy="319006"/>
           </a:xfrm>
           <a:prstGeom prst="rect">
@@ -6748,7 +6739,7 @@
         </p:blipFill>
         <p:spPr bwMode="auto">
           <a:xfrm>
-            <a:off x="5873755" y="2800121"/>
+            <a:off x="5862993" y="2800121"/>
             <a:ext cx="457200" cy="457200"/>
           </a:xfrm>
           <a:prstGeom prst="rect">
@@ -6798,7 +6789,7 @@
         <p:spPr>
           <a:xfrm flipV="1">
             <a:off x="4785360" y="3028721"/>
-            <a:ext cx="1088395" cy="4039"/>
+            <a:ext cx="1077633" cy="4039"/>
           </a:xfrm>
           <a:prstGeom prst="straightConnector1">
             <a:avLst/>
@@ -6845,7 +6836,7 @@
         <p:spPr>
           <a:xfrm flipV="1">
             <a:off x="4785360" y="1476353"/>
-            <a:ext cx="1066798" cy="1927"/>
+            <a:ext cx="1077633" cy="1927"/>
           </a:xfrm>
           <a:prstGeom prst="straightConnector1">
             <a:avLst/>
@@ -6889,7 +6880,7 @@
         </p:nvSpPr>
         <p:spPr bwMode="auto">
           <a:xfrm>
-            <a:off x="5368992" y="1661674"/>
+            <a:off x="5410556" y="1701430"/>
             <a:ext cx="1362074" cy="461665"/>
           </a:xfrm>
           <a:prstGeom prst="rect">
@@ -7177,9 +7168,9 @@
           <p:nvPr/>
         </p:nvCxnSpPr>
         <p:spPr bwMode="auto">
-          <a:xfrm flipV="1">
-            <a:off x="6661457" y="2264073"/>
-            <a:ext cx="241436" cy="0"/>
+          <a:xfrm>
+            <a:off x="6663012" y="2262503"/>
+            <a:ext cx="359149" cy="1570"/>
           </a:xfrm>
           <a:prstGeom prst="straightConnector1">
             <a:avLst/>
@@ -7207,6 +7198,440 @@
           </a:fontRef>
         </p:style>
       </p:cxnSp>
+      <p:pic>
+        <p:nvPicPr>
+          <p:cNvPr id="39" name="Graphic 21">
+            <a:extLst>
+              <a:ext uri="{FF2B5EF4-FFF2-40B4-BE49-F238E27FC236}">
+                <a16:creationId xmlns:a16="http://schemas.microsoft.com/office/drawing/2014/main" id="{3EEB82E2-3F2B-4FDA-9AF2-B67D1D33D904}"/>
+              </a:ext>
+            </a:extLst>
+          </p:cNvPr>
+          <p:cNvPicPr>
+            <a:picLocks noChangeAspect="1" noChangeArrowheads="1"/>
+          </p:cNvPicPr>
+          <p:nvPr/>
+        </p:nvPicPr>
+        <p:blipFill>
+          <a:blip r:embed="rId14">
+            <a:extLst>
+              <a:ext uri="{28A0092B-C50C-407E-A947-70E740481C1C}">
+                <a14:useLocalDpi xmlns:a14="http://schemas.microsoft.com/office/drawing/2010/main" val="0"/>
+              </a:ext>
+            </a:extLst>
+          </a:blip>
+          <a:srcRect/>
+          <a:stretch>
+            <a:fillRect/>
+          </a:stretch>
+        </p:blipFill>
+        <p:spPr bwMode="auto">
+          <a:xfrm>
+            <a:off x="8252944" y="3108024"/>
+            <a:ext cx="762000" cy="762000"/>
+          </a:xfrm>
+          <a:prstGeom prst="rect">
+            <a:avLst/>
+          </a:prstGeom>
+          <a:noFill/>
+          <a:ln>
+            <a:noFill/>
+          </a:ln>
+          <a:extLst>
+            <a:ext uri="{909E8E84-426E-40DD-AFC4-6F175D3DCCD1}">
+              <a14:hiddenFill xmlns:a14="http://schemas.microsoft.com/office/drawing/2010/main">
+                <a:solidFill>
+                  <a:srgbClr val="FFFFFF"/>
+                </a:solidFill>
+              </a14:hiddenFill>
+            </a:ext>
+            <a:ext uri="{91240B29-F687-4F45-9708-019B960494DF}">
+              <a14:hiddenLine xmlns:a14="http://schemas.microsoft.com/office/drawing/2010/main" w="9525">
+                <a:solidFill>
+                  <a:srgbClr val="000000"/>
+                </a:solidFill>
+                <a:miter lim="800000"/>
+                <a:headEnd/>
+                <a:tailEnd/>
+              </a14:hiddenLine>
+            </a:ext>
+          </a:extLst>
+        </p:spPr>
+      </p:pic>
+      <p:sp>
+        <p:nvSpPr>
+          <p:cNvPr id="40" name="TextBox 12">
+            <a:extLst>
+              <a:ext uri="{FF2B5EF4-FFF2-40B4-BE49-F238E27FC236}">
+                <a16:creationId xmlns:a16="http://schemas.microsoft.com/office/drawing/2014/main" id="{690D1061-5ED9-4313-B31E-0C14E9951658}"/>
+              </a:ext>
+            </a:extLst>
+          </p:cNvPr>
+          <p:cNvSpPr txBox="1">
+            <a:spLocks noChangeArrowheads="1"/>
+          </p:cNvSpPr>
+          <p:nvPr/>
+        </p:nvSpPr>
+        <p:spPr bwMode="auto">
+          <a:xfrm>
+            <a:off x="7865157" y="3870024"/>
+            <a:ext cx="1509712" cy="276999"/>
+          </a:xfrm>
+          <a:prstGeom prst="rect">
+            <a:avLst/>
+          </a:prstGeom>
+          <a:noFill/>
+          <a:ln>
+            <a:noFill/>
+          </a:ln>
+          <a:extLst>
+            <a:ext uri="{909E8E84-426E-40DD-AFC4-6F175D3DCCD1}">
+              <a14:hiddenFill xmlns:a14="http://schemas.microsoft.com/office/drawing/2010/main">
+                <a:solidFill>
+                  <a:srgbClr val="FFFFFF"/>
+                </a:solidFill>
+              </a14:hiddenFill>
+            </a:ext>
+            <a:ext uri="{91240B29-F687-4F45-9708-019B960494DF}">
+              <a14:hiddenLine xmlns:a14="http://schemas.microsoft.com/office/drawing/2010/main" w="9525">
+                <a:solidFill>
+                  <a:srgbClr val="000000"/>
+                </a:solidFill>
+                <a:miter lim="800000"/>
+                <a:headEnd/>
+                <a:tailEnd/>
+              </a14:hiddenLine>
+            </a:ext>
+          </a:extLst>
+        </p:spPr>
+        <p:txBody>
+          <a:bodyPr wrap="square">
+            <a:spAutoFit/>
+          </a:bodyPr>
+          <a:lstStyle>
+            <a:lvl1pPr>
+              <a:defRPr>
+                <a:solidFill>
+                  <a:schemeClr val="tx1"/>
+                </a:solidFill>
+                <a:latin typeface="Calibri" panose="020F0502020204030204" pitchFamily="34" charset="0"/>
+              </a:defRPr>
+            </a:lvl1pPr>
+            <a:lvl2pPr marL="742950" indent="-285750">
+              <a:defRPr>
+                <a:solidFill>
+                  <a:schemeClr val="tx1"/>
+                </a:solidFill>
+                <a:latin typeface="Calibri" panose="020F0502020204030204" pitchFamily="34" charset="0"/>
+              </a:defRPr>
+            </a:lvl2pPr>
+            <a:lvl3pPr marL="1143000" indent="-228600">
+              <a:defRPr>
+                <a:solidFill>
+                  <a:schemeClr val="tx1"/>
+                </a:solidFill>
+                <a:latin typeface="Calibri" panose="020F0502020204030204" pitchFamily="34" charset="0"/>
+              </a:defRPr>
+            </a:lvl3pPr>
+            <a:lvl4pPr marL="1600200" indent="-228600">
+              <a:defRPr>
+                <a:solidFill>
+                  <a:schemeClr val="tx1"/>
+                </a:solidFill>
+                <a:latin typeface="Calibri" panose="020F0502020204030204" pitchFamily="34" charset="0"/>
+              </a:defRPr>
+            </a:lvl4pPr>
+            <a:lvl5pPr marL="2057400" indent="-228600">
+              <a:defRPr>
+                <a:solidFill>
+                  <a:schemeClr val="tx1"/>
+                </a:solidFill>
+                <a:latin typeface="Calibri" panose="020F0502020204030204" pitchFamily="34" charset="0"/>
+              </a:defRPr>
+            </a:lvl5pPr>
+            <a:lvl6pPr marL="2514600" indent="-228600" eaLnBrk="0" fontAlgn="base" hangingPunct="0">
+              <a:spcBef>
+                <a:spcPct val="0"/>
+              </a:spcBef>
+              <a:spcAft>
+                <a:spcPct val="0"/>
+              </a:spcAft>
+              <a:defRPr>
+                <a:solidFill>
+                  <a:schemeClr val="tx1"/>
+                </a:solidFill>
+                <a:latin typeface="Calibri" panose="020F0502020204030204" pitchFamily="34" charset="0"/>
+              </a:defRPr>
+            </a:lvl6pPr>
+            <a:lvl7pPr marL="2971800" indent="-228600" eaLnBrk="0" fontAlgn="base" hangingPunct="0">
+              <a:spcBef>
+                <a:spcPct val="0"/>
+              </a:spcBef>
+              <a:spcAft>
+                <a:spcPct val="0"/>
+              </a:spcAft>
+              <a:defRPr>
+                <a:solidFill>
+                  <a:schemeClr val="tx1"/>
+                </a:solidFill>
+                <a:latin typeface="Calibri" panose="020F0502020204030204" pitchFamily="34" charset="0"/>
+              </a:defRPr>
+            </a:lvl7pPr>
+            <a:lvl8pPr marL="3429000" indent="-228600" eaLnBrk="0" fontAlgn="base" hangingPunct="0">
+              <a:spcBef>
+                <a:spcPct val="0"/>
+              </a:spcBef>
+              <a:spcAft>
+                <a:spcPct val="0"/>
+              </a:spcAft>
+              <a:defRPr>
+                <a:solidFill>
+                  <a:schemeClr val="tx1"/>
+                </a:solidFill>
+                <a:latin typeface="Calibri" panose="020F0502020204030204" pitchFamily="34" charset="0"/>
+              </a:defRPr>
+            </a:lvl8pPr>
+            <a:lvl9pPr marL="3886200" indent="-228600" eaLnBrk="0" fontAlgn="base" hangingPunct="0">
+              <a:spcBef>
+                <a:spcPct val="0"/>
+              </a:spcBef>
+              <a:spcAft>
+                <a:spcPct val="0"/>
+              </a:spcAft>
+              <a:defRPr>
+                <a:solidFill>
+                  <a:schemeClr val="tx1"/>
+                </a:solidFill>
+                <a:latin typeface="Calibri" panose="020F0502020204030204" pitchFamily="34" charset="0"/>
+              </a:defRPr>
+            </a:lvl9pPr>
+          </a:lstStyle>
+          <a:p>
+            <a:pPr algn="ctr" eaLnBrk="1" hangingPunct="1"/>
+            <a:r>
+              <a:rPr lang="en-US" altLang="en-US" sz="1200" dirty="0">
+                <a:latin typeface="Arial" panose="020B0604020202020204" pitchFamily="34" charset="0"/>
+                <a:ea typeface="Amazon Ember" panose="020B0603020204020204" pitchFamily="34" charset="0"/>
+                <a:cs typeface="Arial" panose="020B0604020202020204" pitchFamily="34" charset="0"/>
+              </a:rPr>
+              <a:t>AWS CodeCommit</a:t>
+            </a:r>
+          </a:p>
+        </p:txBody>
+      </p:sp>
+      <p:pic>
+        <p:nvPicPr>
+          <p:cNvPr id="41" name="Graphic 10">
+            <a:extLst>
+              <a:ext uri="{FF2B5EF4-FFF2-40B4-BE49-F238E27FC236}">
+                <a16:creationId xmlns:a16="http://schemas.microsoft.com/office/drawing/2014/main" id="{0A3F8A59-883A-4E46-8B1E-D57D9CDBB48A}"/>
+              </a:ext>
+            </a:extLst>
+          </p:cNvPr>
+          <p:cNvPicPr>
+            <a:picLocks noChangeAspect="1" noChangeArrowheads="1"/>
+          </p:cNvPicPr>
+          <p:nvPr/>
+        </p:nvPicPr>
+        <p:blipFill>
+          <a:blip r:embed="rId15"/>
+          <a:srcRect/>
+          <a:stretch/>
+        </p:blipFill>
+        <p:spPr bwMode="auto">
+          <a:xfrm>
+            <a:off x="8296672" y="4486786"/>
+            <a:ext cx="762000" cy="762000"/>
+          </a:xfrm>
+          <a:prstGeom prst="rect">
+            <a:avLst/>
+          </a:prstGeom>
+          <a:noFill/>
+          <a:ln>
+            <a:noFill/>
+          </a:ln>
+          <a:extLst>
+            <a:ext uri="{909E8E84-426E-40DD-AFC4-6F175D3DCCD1}">
+              <a14:hiddenFill xmlns:a14="http://schemas.microsoft.com/office/drawing/2010/main">
+                <a:solidFill>
+                  <a:srgbClr val="FFFFFF"/>
+                </a:solidFill>
+              </a14:hiddenFill>
+            </a:ext>
+            <a:ext uri="{91240B29-F687-4F45-9708-019B960494DF}">
+              <a14:hiddenLine xmlns:a14="http://schemas.microsoft.com/office/drawing/2010/main" w="9525">
+                <a:solidFill>
+                  <a:srgbClr val="000000"/>
+                </a:solidFill>
+                <a:miter lim="800000"/>
+                <a:headEnd/>
+                <a:tailEnd/>
+              </a14:hiddenLine>
+            </a:ext>
+          </a:extLst>
+        </p:spPr>
+      </p:pic>
+      <p:sp>
+        <p:nvSpPr>
+          <p:cNvPr id="42" name="TextBox 6">
+            <a:extLst>
+              <a:ext uri="{FF2B5EF4-FFF2-40B4-BE49-F238E27FC236}">
+                <a16:creationId xmlns:a16="http://schemas.microsoft.com/office/drawing/2014/main" id="{5746D11C-5B91-4266-BFA3-3235B4CD2608}"/>
+              </a:ext>
+            </a:extLst>
+          </p:cNvPr>
+          <p:cNvSpPr txBox="1">
+            <a:spLocks noChangeArrowheads="1"/>
+          </p:cNvSpPr>
+          <p:nvPr/>
+        </p:nvSpPr>
+        <p:spPr bwMode="auto">
+          <a:xfrm>
+            <a:off x="8137531" y="5248786"/>
+            <a:ext cx="1063341" cy="276999"/>
+          </a:xfrm>
+          <a:prstGeom prst="rect">
+            <a:avLst/>
+          </a:prstGeom>
+          <a:noFill/>
+          <a:ln>
+            <a:noFill/>
+          </a:ln>
+          <a:extLst>
+            <a:ext uri="{909E8E84-426E-40DD-AFC4-6F175D3DCCD1}">
+              <a14:hiddenFill xmlns:a14="http://schemas.microsoft.com/office/drawing/2010/main">
+                <a:solidFill>
+                  <a:srgbClr val="FFFFFF"/>
+                </a:solidFill>
+              </a14:hiddenFill>
+            </a:ext>
+            <a:ext uri="{91240B29-F687-4F45-9708-019B960494DF}">
+              <a14:hiddenLine xmlns:a14="http://schemas.microsoft.com/office/drawing/2010/main" w="9525">
+                <a:solidFill>
+                  <a:srgbClr val="000000"/>
+                </a:solidFill>
+                <a:miter lim="800000"/>
+                <a:headEnd/>
+                <a:tailEnd/>
+              </a14:hiddenLine>
+            </a:ext>
+          </a:extLst>
+        </p:spPr>
+        <p:txBody>
+          <a:bodyPr wrap="square">
+            <a:spAutoFit/>
+          </a:bodyPr>
+          <a:lstStyle>
+            <a:lvl1pPr>
+              <a:defRPr>
+                <a:solidFill>
+                  <a:schemeClr val="tx1"/>
+                </a:solidFill>
+                <a:latin typeface="Calibri" panose="020F0502020204030204" pitchFamily="34" charset="0"/>
+              </a:defRPr>
+            </a:lvl1pPr>
+            <a:lvl2pPr marL="742950" indent="-285750">
+              <a:defRPr>
+                <a:solidFill>
+                  <a:schemeClr val="tx1"/>
+                </a:solidFill>
+                <a:latin typeface="Calibri" panose="020F0502020204030204" pitchFamily="34" charset="0"/>
+              </a:defRPr>
+            </a:lvl2pPr>
+            <a:lvl3pPr marL="1143000" indent="-228600">
+              <a:defRPr>
+                <a:solidFill>
+                  <a:schemeClr val="tx1"/>
+                </a:solidFill>
+                <a:latin typeface="Calibri" panose="020F0502020204030204" pitchFamily="34" charset="0"/>
+              </a:defRPr>
+            </a:lvl3pPr>
+            <a:lvl4pPr marL="1600200" indent="-228600">
+              <a:defRPr>
+                <a:solidFill>
+                  <a:schemeClr val="tx1"/>
+                </a:solidFill>
+                <a:latin typeface="Calibri" panose="020F0502020204030204" pitchFamily="34" charset="0"/>
+              </a:defRPr>
+            </a:lvl4pPr>
+            <a:lvl5pPr marL="2057400" indent="-228600">
+              <a:defRPr>
+                <a:solidFill>
+                  <a:schemeClr val="tx1"/>
+                </a:solidFill>
+                <a:latin typeface="Calibri" panose="020F0502020204030204" pitchFamily="34" charset="0"/>
+              </a:defRPr>
+            </a:lvl5pPr>
+            <a:lvl6pPr marL="2514600" indent="-228600" eaLnBrk="0" fontAlgn="base" hangingPunct="0">
+              <a:spcBef>
+                <a:spcPct val="0"/>
+              </a:spcBef>
+              <a:spcAft>
+                <a:spcPct val="0"/>
+              </a:spcAft>
+              <a:defRPr>
+                <a:solidFill>
+                  <a:schemeClr val="tx1"/>
+                </a:solidFill>
+                <a:latin typeface="Calibri" panose="020F0502020204030204" pitchFamily="34" charset="0"/>
+              </a:defRPr>
+            </a:lvl6pPr>
+            <a:lvl7pPr marL="2971800" indent="-228600" eaLnBrk="0" fontAlgn="base" hangingPunct="0">
+              <a:spcBef>
+                <a:spcPct val="0"/>
+              </a:spcBef>
+              <a:spcAft>
+                <a:spcPct val="0"/>
+              </a:spcAft>
+              <a:defRPr>
+                <a:solidFill>
+                  <a:schemeClr val="tx1"/>
+                </a:solidFill>
+                <a:latin typeface="Calibri" panose="020F0502020204030204" pitchFamily="34" charset="0"/>
+              </a:defRPr>
+            </a:lvl7pPr>
+            <a:lvl8pPr marL="3429000" indent="-228600" eaLnBrk="0" fontAlgn="base" hangingPunct="0">
+              <a:spcBef>
+                <a:spcPct val="0"/>
+              </a:spcBef>
+              <a:spcAft>
+                <a:spcPct val="0"/>
+              </a:spcAft>
+              <a:defRPr>
+                <a:solidFill>
+                  <a:schemeClr val="tx1"/>
+                </a:solidFill>
+                <a:latin typeface="Calibri" panose="020F0502020204030204" pitchFamily="34" charset="0"/>
+              </a:defRPr>
+            </a:lvl8pPr>
+            <a:lvl9pPr marL="3886200" indent="-228600" eaLnBrk="0" fontAlgn="base" hangingPunct="0">
+              <a:spcBef>
+                <a:spcPct val="0"/>
+              </a:spcBef>
+              <a:spcAft>
+                <a:spcPct val="0"/>
+              </a:spcAft>
+              <a:defRPr>
+                <a:solidFill>
+                  <a:schemeClr val="tx1"/>
+                </a:solidFill>
+                <a:latin typeface="Calibri" panose="020F0502020204030204" pitchFamily="34" charset="0"/>
+              </a:defRPr>
+            </a:lvl9pPr>
+          </a:lstStyle>
+          <a:p>
+            <a:pPr algn="ctr" eaLnBrk="1" hangingPunct="1"/>
+            <a:r>
+              <a:rPr lang="en-US" altLang="en-US" sz="1200" dirty="0">
+                <a:latin typeface="Arial" panose="020B0604020202020204" pitchFamily="34" charset="0"/>
+                <a:ea typeface="Amazon Ember" panose="020B0603020204020204" pitchFamily="34" charset="0"/>
+                <a:cs typeface="Arial" panose="020B0604020202020204" pitchFamily="34" charset="0"/>
+              </a:rPr>
+              <a:t>AWS Amplify</a:t>
+            </a:r>
+          </a:p>
+        </p:txBody>
+      </p:sp>
     </p:spTree>
     <p:extLst>
       <p:ext uri="{BB962C8B-B14F-4D97-AF65-F5344CB8AC3E}">

</xml_diff>

<commit_message>
Doc edits based on further research and understanding
</commit_message>
<xml_diff>
--- a/docs/images/iot-connectivity-security-architecture-diagram.pptx
+++ b/docs/images/iot-connectivity-security-architecture-diagram.pptx
@@ -218,7 +218,7 @@
           <a:p>
             <a:fld id="{DBD8A52E-30DC-764B-8FF7-3BCE736694E8}" type="datetimeFigureOut">
               <a:rPr lang="en-US" smtClean="0"/>
-              <a:t>12/11/2021</a:t>
+              <a:t>12/28/2021</a:t>
             </a:fld>
             <a:endParaRPr lang="en-US" dirty="0"/>
           </a:p>
@@ -893,7 +893,7 @@
           <a:p>
             <a:fld id="{AA678395-77B4-A94B-9499-8B71386560B3}" type="datetimeFigureOut">
               <a:rPr lang="en-US" smtClean="0"/>
-              <a:t>12/11/2021</a:t>
+              <a:t>12/28/2021</a:t>
             </a:fld>
             <a:endParaRPr lang="en-US" dirty="0"/>
           </a:p>
@@ -1091,7 +1091,7 @@
           <a:p>
             <a:fld id="{AA678395-77B4-A94B-9499-8B71386560B3}" type="datetimeFigureOut">
               <a:rPr lang="en-US" smtClean="0"/>
-              <a:t>12/11/2021</a:t>
+              <a:t>12/28/2021</a:t>
             </a:fld>
             <a:endParaRPr lang="en-US" dirty="0"/>
           </a:p>
@@ -1299,7 +1299,7 @@
           <a:p>
             <a:fld id="{AA678395-77B4-A94B-9499-8B71386560B3}" type="datetimeFigureOut">
               <a:rPr lang="en-US" smtClean="0"/>
-              <a:t>12/11/2021</a:t>
+              <a:t>12/28/2021</a:t>
             </a:fld>
             <a:endParaRPr lang="en-US" dirty="0"/>
           </a:p>
@@ -1497,7 +1497,7 @@
           <a:p>
             <a:fld id="{AA678395-77B4-A94B-9499-8B71386560B3}" type="datetimeFigureOut">
               <a:rPr lang="en-US" smtClean="0"/>
-              <a:t>12/11/2021</a:t>
+              <a:t>12/28/2021</a:t>
             </a:fld>
             <a:endParaRPr lang="en-US" dirty="0"/>
           </a:p>
@@ -1772,7 +1772,7 @@
           <a:p>
             <a:fld id="{AA678395-77B4-A94B-9499-8B71386560B3}" type="datetimeFigureOut">
               <a:rPr lang="en-US" smtClean="0"/>
-              <a:t>12/11/2021</a:t>
+              <a:t>12/28/2021</a:t>
             </a:fld>
             <a:endParaRPr lang="en-US" dirty="0"/>
           </a:p>
@@ -2037,7 +2037,7 @@
           <a:p>
             <a:fld id="{AA678395-77B4-A94B-9499-8B71386560B3}" type="datetimeFigureOut">
               <a:rPr lang="en-US" smtClean="0"/>
-              <a:t>12/11/2021</a:t>
+              <a:t>12/28/2021</a:t>
             </a:fld>
             <a:endParaRPr lang="en-US" dirty="0"/>
           </a:p>
@@ -2449,7 +2449,7 @@
           <a:p>
             <a:fld id="{AA678395-77B4-A94B-9499-8B71386560B3}" type="datetimeFigureOut">
               <a:rPr lang="en-US" smtClean="0"/>
-              <a:t>12/11/2021</a:t>
+              <a:t>12/28/2021</a:t>
             </a:fld>
             <a:endParaRPr lang="en-US" dirty="0"/>
           </a:p>
@@ -2590,7 +2590,7 @@
           <a:p>
             <a:fld id="{AA678395-77B4-A94B-9499-8B71386560B3}" type="datetimeFigureOut">
               <a:rPr lang="en-US" smtClean="0"/>
-              <a:t>12/11/2021</a:t>
+              <a:t>12/28/2021</a:t>
             </a:fld>
             <a:endParaRPr lang="en-US" dirty="0"/>
           </a:p>
@@ -2703,7 +2703,7 @@
           <a:p>
             <a:fld id="{AA678395-77B4-A94B-9499-8B71386560B3}" type="datetimeFigureOut">
               <a:rPr lang="en-US" smtClean="0"/>
-              <a:t>12/11/2021</a:t>
+              <a:t>12/28/2021</a:t>
             </a:fld>
             <a:endParaRPr lang="en-US" dirty="0"/>
           </a:p>
@@ -3014,7 +3014,7 @@
           <a:p>
             <a:fld id="{AA678395-77B4-A94B-9499-8B71386560B3}" type="datetimeFigureOut">
               <a:rPr lang="en-US" smtClean="0"/>
-              <a:t>12/11/2021</a:t>
+              <a:t>12/28/2021</a:t>
             </a:fld>
             <a:endParaRPr lang="en-US" dirty="0"/>
           </a:p>
@@ -3302,7 +3302,7 @@
           <a:p>
             <a:fld id="{AA678395-77B4-A94B-9499-8B71386560B3}" type="datetimeFigureOut">
               <a:rPr lang="en-US" smtClean="0"/>
-              <a:t>12/11/2021</a:t>
+              <a:t>12/28/2021</a:t>
             </a:fld>
             <a:endParaRPr lang="en-US" dirty="0"/>
           </a:p>
@@ -3543,7 +3543,7 @@
           <a:p>
             <a:fld id="{AA678395-77B4-A94B-9499-8B71386560B3}" type="datetimeFigureOut">
               <a:rPr lang="en-US" smtClean="0"/>
-              <a:t>12/11/2021</a:t>
+              <a:t>12/28/2021</a:t>
             </a:fld>
             <a:endParaRPr lang="en-US" dirty="0"/>
           </a:p>
@@ -4903,7 +4903,7 @@
         </p:blipFill>
         <p:spPr bwMode="auto">
           <a:xfrm>
-            <a:off x="6854953" y="4484448"/>
+            <a:off x="6931155" y="4484448"/>
             <a:ext cx="762000" cy="762000"/>
           </a:xfrm>
           <a:prstGeom prst="rect">
@@ -4950,7 +4950,7 @@
         </p:nvSpPr>
         <p:spPr bwMode="auto">
           <a:xfrm>
-            <a:off x="6562241" y="5248786"/>
+            <a:off x="6638443" y="5248786"/>
             <a:ext cx="1340506" cy="276999"/>
           </a:xfrm>
           <a:prstGeom prst="rect">
@@ -5271,7 +5271,7 @@
                   <a:ea typeface="Amazon Ember" panose="020B0603020204020204" pitchFamily="34" charset="0"/>
                   <a:cs typeface="Arial" panose="020B0604020202020204" pitchFamily="34" charset="0"/>
                 </a:rPr>
-                <a:t>IoT device </a:t>
+                <a:t>IoT devices </a:t>
               </a:r>
             </a:p>
           </p:txBody>
@@ -6155,8 +6155,8 @@
         </p:nvSpPr>
         <p:spPr bwMode="auto">
           <a:xfrm>
-            <a:off x="6711702" y="2472545"/>
-            <a:ext cx="1058743" cy="646331"/>
+            <a:off x="6787904" y="2657607"/>
+            <a:ext cx="1058743" cy="461665"/>
           </a:xfrm>
           <a:prstGeom prst="rect">
             <a:avLst/>
@@ -6296,78 +6296,14 @@
               </a:rPr>
               <a:t>Amazon API Gateway</a:t>
             </a:r>
-          </a:p>
-          <a:p>
-            <a:pPr algn="ctr" eaLnBrk="1" hangingPunct="1"/>
-            <a:r>
-              <a:rPr lang="en-US" altLang="en-US" sz="1200" dirty="0">
-                <a:latin typeface="Arial" panose="020B0604020202020204" pitchFamily="34" charset="0"/>
-                <a:ea typeface="Amazon Ember" panose="020B0603020204020204" pitchFamily="34" charset="0"/>
-                <a:cs typeface="Arial" panose="020B0604020202020204" pitchFamily="34" charset="0"/>
-              </a:rPr>
-              <a:t> endpoints</a:t>
-            </a:r>
+            <a:endParaRPr lang="en-US" altLang="en-US" sz="1200" dirty="0">
+              <a:latin typeface="Arial" panose="020B0604020202020204" pitchFamily="34" charset="0"/>
+              <a:ea typeface="Amazon Ember" panose="020B0603020204020204" pitchFamily="34" charset="0"/>
+              <a:cs typeface="Arial" panose="020B0604020202020204" pitchFamily="34" charset="0"/>
+            </a:endParaRPr>
           </a:p>
         </p:txBody>
       </p:sp>
-      <p:pic>
-        <p:nvPicPr>
-          <p:cNvPr id="92" name="Graphic 6">
-            <a:extLst>
-              <a:ext uri="{FF2B5EF4-FFF2-40B4-BE49-F238E27FC236}">
-                <a16:creationId xmlns:a16="http://schemas.microsoft.com/office/drawing/2014/main" id="{3296B3EE-04F7-4011-BBEA-CEBA691B0C1A}"/>
-              </a:ext>
-            </a:extLst>
-          </p:cNvPr>
-          <p:cNvPicPr>
-            <a:picLocks noChangeAspect="1" noChangeArrowheads="1"/>
-          </p:cNvPicPr>
-          <p:nvPr/>
-        </p:nvPicPr>
-        <p:blipFill>
-          <a:blip r:embed="rId11">
-            <a:extLst>
-              <a:ext uri="{96DAC541-7B7A-43D3-8B79-37D633B846F1}">
-                <asvg:svgBlip xmlns:asvg="http://schemas.microsoft.com/office/drawing/2016/SVG/main" r:embed="rId12"/>
-              </a:ext>
-            </a:extLst>
-          </a:blip>
-          <a:srcRect/>
-          <a:stretch/>
-        </p:blipFill>
-        <p:spPr bwMode="auto">
-          <a:xfrm>
-            <a:off x="7022161" y="2035473"/>
-            <a:ext cx="457200" cy="457200"/>
-          </a:xfrm>
-          <a:prstGeom prst="rect">
-            <a:avLst/>
-          </a:prstGeom>
-          <a:noFill/>
-          <a:ln>
-            <a:noFill/>
-          </a:ln>
-          <a:extLst>
-            <a:ext uri="{909E8E84-426E-40DD-AFC4-6F175D3DCCD1}">
-              <a14:hiddenFill xmlns:a14="http://schemas.microsoft.com/office/drawing/2010/main">
-                <a:solidFill>
-                  <a:srgbClr val="FFFFFF"/>
-                </a:solidFill>
-              </a14:hiddenFill>
-            </a:ext>
-            <a:ext uri="{91240B29-F687-4F45-9708-019B960494DF}">
-              <a14:hiddenLine xmlns:a14="http://schemas.microsoft.com/office/drawing/2010/main" w="9525">
-                <a:solidFill>
-                  <a:srgbClr val="000000"/>
-                </a:solidFill>
-                <a:miter lim="800000"/>
-                <a:headEnd/>
-                <a:tailEnd/>
-              </a14:hiddenLine>
-            </a:ext>
-          </a:extLst>
-        </p:spPr>
-      </p:pic>
       <p:cxnSp>
         <p:nvCxnSpPr>
           <p:cNvPr id="95" name="Straight Arrow Connector 94">
@@ -6568,14 +6504,14 @@
           <p:cNvCxnSpPr>
             <a:cxnSpLocks/>
             <a:stCxn id="47" idx="1"/>
-            <a:endCxn id="92" idx="3"/>
+            <a:endCxn id="43" idx="3"/>
           </p:cNvCxnSpPr>
           <p:nvPr/>
         </p:nvCxnSpPr>
         <p:spPr>
           <a:xfrm flipH="1">
-            <a:off x="7479361" y="2262503"/>
-            <a:ext cx="2217105" cy="1570"/>
+            <a:off x="7728755" y="2262503"/>
+            <a:ext cx="1967711" cy="0"/>
           </a:xfrm>
           <a:prstGeom prst="straightConnector1">
             <a:avLst/>
@@ -6621,8 +6557,8 @@
         </p:nvCxnSpPr>
         <p:spPr>
           <a:xfrm flipV="1">
-            <a:off x="7235953" y="3118876"/>
-            <a:ext cx="5121" cy="1365572"/>
+            <a:off x="7312155" y="3119272"/>
+            <a:ext cx="5121" cy="1365176"/>
           </a:xfrm>
           <a:prstGeom prst="straightConnector1">
             <a:avLst/>
@@ -6665,7 +6601,7 @@
           <p:nvPr/>
         </p:nvPicPr>
         <p:blipFill>
-          <a:blip r:embed="rId13">
+          <a:blip r:embed="rId11">
             <a:extLst>
               <a:ext uri="{28A0092B-C50C-407E-A947-70E740481C1C}">
                 <a14:useLocalDpi xmlns:a14="http://schemas.microsoft.com/office/drawing/2010/main" val="0"/>
@@ -7163,14 +7099,14 @@
           </p:cNvPr>
           <p:cNvCxnSpPr>
             <a:cxnSpLocks/>
-            <a:endCxn id="92" idx="1"/>
+            <a:endCxn id="43" idx="1"/>
           </p:cNvCxnSpPr>
           <p:nvPr/>
         </p:nvCxnSpPr>
         <p:spPr bwMode="auto">
           <a:xfrm>
-            <a:off x="6663012" y="2262503"/>
-            <a:ext cx="359149" cy="1570"/>
+            <a:off x="6663012" y="2273446"/>
+            <a:ext cx="303743" cy="0"/>
           </a:xfrm>
           <a:prstGeom prst="straightConnector1">
             <a:avLst/>
@@ -7213,7 +7149,7 @@
           <p:nvPr/>
         </p:nvPicPr>
         <p:blipFill>
-          <a:blip r:embed="rId14">
+          <a:blip r:embed="rId12">
             <a:extLst>
               <a:ext uri="{28A0092B-C50C-407E-A947-70E740481C1C}">
                 <a14:useLocalDpi xmlns:a14="http://schemas.microsoft.com/office/drawing/2010/main" val="0"/>
@@ -7434,7 +7370,7 @@
           <p:nvPr/>
         </p:nvPicPr>
         <p:blipFill>
-          <a:blip r:embed="rId15"/>
+          <a:blip r:embed="rId13"/>
           <a:srcRect/>
           <a:stretch/>
         </p:blipFill>
@@ -7632,6 +7568,58 @@
           </a:p>
         </p:txBody>
       </p:sp>
+      <p:pic>
+        <p:nvPicPr>
+          <p:cNvPr id="43" name="Graphic 17">
+            <a:extLst>
+              <a:ext uri="{FF2B5EF4-FFF2-40B4-BE49-F238E27FC236}">
+                <a16:creationId xmlns:a16="http://schemas.microsoft.com/office/drawing/2014/main" id="{847A7472-D977-624B-9A30-47A44C4FD42F}"/>
+              </a:ext>
+            </a:extLst>
+          </p:cNvPr>
+          <p:cNvPicPr>
+            <a:picLocks noChangeAspect="1" noChangeArrowheads="1"/>
+          </p:cNvPicPr>
+          <p:nvPr/>
+        </p:nvPicPr>
+        <p:blipFill>
+          <a:blip r:embed="rId14"/>
+          <a:srcRect/>
+          <a:stretch/>
+        </p:blipFill>
+        <p:spPr bwMode="auto">
+          <a:xfrm>
+            <a:off x="6966755" y="1892446"/>
+            <a:ext cx="762000" cy="762000"/>
+          </a:xfrm>
+          <a:prstGeom prst="rect">
+            <a:avLst/>
+          </a:prstGeom>
+          <a:noFill/>
+          <a:ln>
+            <a:noFill/>
+          </a:ln>
+          <a:extLst>
+            <a:ext uri="{909E8E84-426E-40DD-AFC4-6F175D3DCCD1}">
+              <a14:hiddenFill xmlns:a14="http://schemas.microsoft.com/office/drawing/2010/main">
+                <a:solidFill>
+                  <a:srgbClr val="FFFFFF"/>
+                </a:solidFill>
+              </a14:hiddenFill>
+            </a:ext>
+            <a:ext uri="{91240B29-F687-4F45-9708-019B960494DF}">
+              <a14:hiddenLine xmlns:a14="http://schemas.microsoft.com/office/drawing/2010/main" w="9525">
+                <a:solidFill>
+                  <a:srgbClr val="000000"/>
+                </a:solidFill>
+                <a:miter lim="800000"/>
+                <a:headEnd/>
+                <a:tailEnd/>
+              </a14:hiddenLine>
+            </a:ext>
+          </a:extLst>
+        </p:spPr>
+      </p:pic>
     </p:spTree>
     <p:extLst>
       <p:ext uri="{BB962C8B-B14F-4D97-AF65-F5344CB8AC3E}">

</xml_diff>